<commit_message>
Fices clustering pres according to Merlini's directives
</commit_message>
<xml_diff>
--- a/pres/cheat4.pptx
+++ b/pres/cheat4.pptx
@@ -4,6 +4,9 @@
   <p:sldMasterIdLst>
     <p:sldMasterId id="2147483648" r:id="rId1"/>
   </p:sldMasterIdLst>
+  <p:notesMasterIdLst>
+    <p:notesMasterId r:id="rId3"/>
+  </p:notesMasterIdLst>
   <p:sldIdLst>
     <p:sldId id="256" r:id="rId2"/>
   </p:sldIdLst>
@@ -104,7 +107,446 @@
       </a:defRPr>
     </a:lvl9pPr>
   </p:defaultTextStyle>
+  <p:extLst>
+    <p:ext uri="{EFAFB233-063F-42B5-8137-9DF3F51BA10A}">
+      <p15:sldGuideLst xmlns:p15="http://schemas.microsoft.com/office/powerpoint/2012/main"/>
+    </p:ext>
+  </p:extLst>
 </p:presentation>
+</file>
+
+<file path=ppt/notesMasters/notesMaster1.xml><?xml version="1.0" encoding="utf-8"?>
+<p:notesMaster xmlns:a="http://schemas.openxmlformats.org/drawingml/2006/main" xmlns:r="http://schemas.openxmlformats.org/officeDocument/2006/relationships" xmlns:p="http://schemas.openxmlformats.org/presentationml/2006/main">
+  <p:cSld>
+    <p:bg>
+      <p:bgRef idx="1001">
+        <a:schemeClr val="bg1"/>
+      </p:bgRef>
+    </p:bg>
+    <p:spTree>
+      <p:nvGrpSpPr>
+        <p:cNvPr id="1" name=""/>
+        <p:cNvGrpSpPr/>
+        <p:nvPr/>
+      </p:nvGrpSpPr>
+      <p:grpSpPr>
+        <a:xfrm>
+          <a:off x="0" y="0"/>
+          <a:ext cx="0" cy="0"/>
+          <a:chOff x="0" y="0"/>
+          <a:chExt cx="0" cy="0"/>
+        </a:xfrm>
+      </p:grpSpPr>
+      <p:sp>
+        <p:nvSpPr>
+          <p:cNvPr id="2" name="Segnaposto intestazione 1"/>
+          <p:cNvSpPr>
+            <a:spLocks noGrp="1"/>
+          </p:cNvSpPr>
+          <p:nvPr>
+            <p:ph type="hdr" sz="quarter"/>
+          </p:nvPr>
+        </p:nvSpPr>
+        <p:spPr>
+          <a:xfrm>
+            <a:off x="0" y="0"/>
+            <a:ext cx="2971800" cy="458788"/>
+          </a:xfrm>
+          <a:prstGeom prst="rect">
+            <a:avLst/>
+          </a:prstGeom>
+        </p:spPr>
+        <p:txBody>
+          <a:bodyPr vert="horz" lIns="91440" tIns="45720" rIns="91440" bIns="45720" rtlCol="0"/>
+          <a:lstStyle>
+            <a:lvl1pPr algn="l">
+              <a:defRPr sz="1200"/>
+            </a:lvl1pPr>
+          </a:lstStyle>
+          <a:p>
+            <a:endParaRPr lang="en-US"/>
+          </a:p>
+        </p:txBody>
+      </p:sp>
+      <p:sp>
+        <p:nvSpPr>
+          <p:cNvPr id="3" name="Segnaposto data 2"/>
+          <p:cNvSpPr>
+            <a:spLocks noGrp="1"/>
+          </p:cNvSpPr>
+          <p:nvPr>
+            <p:ph type="dt" idx="1"/>
+          </p:nvPr>
+        </p:nvSpPr>
+        <p:spPr>
+          <a:xfrm>
+            <a:off x="3884613" y="0"/>
+            <a:ext cx="2971800" cy="458788"/>
+          </a:xfrm>
+          <a:prstGeom prst="rect">
+            <a:avLst/>
+          </a:prstGeom>
+        </p:spPr>
+        <p:txBody>
+          <a:bodyPr vert="horz" lIns="91440" tIns="45720" rIns="91440" bIns="45720" rtlCol="0"/>
+          <a:lstStyle>
+            <a:lvl1pPr algn="r">
+              <a:defRPr sz="1200"/>
+            </a:lvl1pPr>
+          </a:lstStyle>
+          <a:p>
+            <a:fld id="{A79689FD-46B7-4994-BAA6-1A5A466EC6D1}" type="datetimeFigureOut">
+              <a:rPr lang="en-US" smtClean="0"/>
+              <a:t>9/14/2018</a:t>
+            </a:fld>
+            <a:endParaRPr lang="en-US"/>
+          </a:p>
+        </p:txBody>
+      </p:sp>
+      <p:sp>
+        <p:nvSpPr>
+          <p:cNvPr id="4" name="Segnaposto immagine diapositiva 3"/>
+          <p:cNvSpPr>
+            <a:spLocks noGrp="1" noRot="1" noChangeAspect="1"/>
+          </p:cNvSpPr>
+          <p:nvPr>
+            <p:ph type="sldImg" idx="2"/>
+          </p:nvPr>
+        </p:nvSpPr>
+        <p:spPr>
+          <a:xfrm>
+            <a:off x="685800" y="1143000"/>
+            <a:ext cx="5486400" cy="3086100"/>
+          </a:xfrm>
+          <a:prstGeom prst="rect">
+            <a:avLst/>
+          </a:prstGeom>
+          <a:noFill/>
+          <a:ln w="12700">
+            <a:solidFill>
+              <a:prstClr val="black"/>
+            </a:solidFill>
+          </a:ln>
+        </p:spPr>
+        <p:txBody>
+          <a:bodyPr vert="horz" lIns="91440" tIns="45720" rIns="91440" bIns="45720" rtlCol="0" anchor="ctr"/>
+          <a:lstStyle/>
+          <a:p>
+            <a:endParaRPr lang="en-US"/>
+          </a:p>
+        </p:txBody>
+      </p:sp>
+      <p:sp>
+        <p:nvSpPr>
+          <p:cNvPr id="5" name="Segnaposto note 4"/>
+          <p:cNvSpPr>
+            <a:spLocks noGrp="1"/>
+          </p:cNvSpPr>
+          <p:nvPr>
+            <p:ph type="body" sz="quarter" idx="3"/>
+          </p:nvPr>
+        </p:nvSpPr>
+        <p:spPr>
+          <a:xfrm>
+            <a:off x="685800" y="4400550"/>
+            <a:ext cx="5486400" cy="3600450"/>
+          </a:xfrm>
+          <a:prstGeom prst="rect">
+            <a:avLst/>
+          </a:prstGeom>
+        </p:spPr>
+        <p:txBody>
+          <a:bodyPr vert="horz" lIns="91440" tIns="45720" rIns="91440" bIns="45720" rtlCol="0"/>
+          <a:lstStyle/>
+          <a:p>
+            <a:pPr lvl="0"/>
+            <a:r>
+              <a:rPr lang="it-IT"/>
+              <a:t>Modifica gli stili del testo dello schema</a:t>
+            </a:r>
+          </a:p>
+          <a:p>
+            <a:pPr lvl="1"/>
+            <a:r>
+              <a:rPr lang="it-IT"/>
+              <a:t>Secondo livello</a:t>
+            </a:r>
+          </a:p>
+          <a:p>
+            <a:pPr lvl="2"/>
+            <a:r>
+              <a:rPr lang="it-IT"/>
+              <a:t>Terzo livello</a:t>
+            </a:r>
+          </a:p>
+          <a:p>
+            <a:pPr lvl="3"/>
+            <a:r>
+              <a:rPr lang="it-IT"/>
+              <a:t>Quarto livello</a:t>
+            </a:r>
+          </a:p>
+          <a:p>
+            <a:pPr lvl="4"/>
+            <a:r>
+              <a:rPr lang="it-IT"/>
+              <a:t>Quinto livello</a:t>
+            </a:r>
+            <a:endParaRPr lang="en-US"/>
+          </a:p>
+        </p:txBody>
+      </p:sp>
+      <p:sp>
+        <p:nvSpPr>
+          <p:cNvPr id="6" name="Segnaposto piè di pagina 5"/>
+          <p:cNvSpPr>
+            <a:spLocks noGrp="1"/>
+          </p:cNvSpPr>
+          <p:nvPr>
+            <p:ph type="ftr" sz="quarter" idx="4"/>
+          </p:nvPr>
+        </p:nvSpPr>
+        <p:spPr>
+          <a:xfrm>
+            <a:off x="0" y="8685213"/>
+            <a:ext cx="2971800" cy="458787"/>
+          </a:xfrm>
+          <a:prstGeom prst="rect">
+            <a:avLst/>
+          </a:prstGeom>
+        </p:spPr>
+        <p:txBody>
+          <a:bodyPr vert="horz" lIns="91440" tIns="45720" rIns="91440" bIns="45720" rtlCol="0" anchor="b"/>
+          <a:lstStyle>
+            <a:lvl1pPr algn="l">
+              <a:defRPr sz="1200"/>
+            </a:lvl1pPr>
+          </a:lstStyle>
+          <a:p>
+            <a:endParaRPr lang="en-US"/>
+          </a:p>
+        </p:txBody>
+      </p:sp>
+      <p:sp>
+        <p:nvSpPr>
+          <p:cNvPr id="7" name="Segnaposto numero diapositiva 6"/>
+          <p:cNvSpPr>
+            <a:spLocks noGrp="1"/>
+          </p:cNvSpPr>
+          <p:nvPr>
+            <p:ph type="sldNum" sz="quarter" idx="5"/>
+          </p:nvPr>
+        </p:nvSpPr>
+        <p:spPr>
+          <a:xfrm>
+            <a:off x="3884613" y="8685213"/>
+            <a:ext cx="2971800" cy="458787"/>
+          </a:xfrm>
+          <a:prstGeom prst="rect">
+            <a:avLst/>
+          </a:prstGeom>
+        </p:spPr>
+        <p:txBody>
+          <a:bodyPr vert="horz" lIns="91440" tIns="45720" rIns="91440" bIns="45720" rtlCol="0" anchor="b"/>
+          <a:lstStyle>
+            <a:lvl1pPr algn="r">
+              <a:defRPr sz="1200"/>
+            </a:lvl1pPr>
+          </a:lstStyle>
+          <a:p>
+            <a:fld id="{817BF706-9A80-43C7-B836-7F4C1C6E9964}" type="slidenum">
+              <a:rPr lang="en-US" smtClean="0"/>
+              <a:t>‹N›</a:t>
+            </a:fld>
+            <a:endParaRPr lang="en-US"/>
+          </a:p>
+        </p:txBody>
+      </p:sp>
+    </p:spTree>
+    <p:extLst>
+      <p:ext uri="{BB962C8B-B14F-4D97-AF65-F5344CB8AC3E}">
+        <p14:creationId xmlns:p14="http://schemas.microsoft.com/office/powerpoint/2010/main" val="3422548353"/>
+      </p:ext>
+    </p:extLst>
+  </p:cSld>
+  <p:clrMap bg1="lt1" tx1="dk1" bg2="lt2" tx2="dk2" accent1="accent1" accent2="accent2" accent3="accent3" accent4="accent4" accent5="accent5" accent6="accent6" hlink="hlink" folHlink="folHlink"/>
+  <p:notesStyle>
+    <a:lvl1pPr marL="0" algn="l" defTabSz="914400" rtl="0" eaLnBrk="1" latinLnBrk="0" hangingPunct="1">
+      <a:defRPr sz="1200" kern="1200">
+        <a:solidFill>
+          <a:schemeClr val="tx1"/>
+        </a:solidFill>
+        <a:latin typeface="+mn-lt"/>
+        <a:ea typeface="+mn-ea"/>
+        <a:cs typeface="+mn-cs"/>
+      </a:defRPr>
+    </a:lvl1pPr>
+    <a:lvl2pPr marL="457200" algn="l" defTabSz="914400" rtl="0" eaLnBrk="1" latinLnBrk="0" hangingPunct="1">
+      <a:defRPr sz="1200" kern="1200">
+        <a:solidFill>
+          <a:schemeClr val="tx1"/>
+        </a:solidFill>
+        <a:latin typeface="+mn-lt"/>
+        <a:ea typeface="+mn-ea"/>
+        <a:cs typeface="+mn-cs"/>
+      </a:defRPr>
+    </a:lvl2pPr>
+    <a:lvl3pPr marL="914400" algn="l" defTabSz="914400" rtl="0" eaLnBrk="1" latinLnBrk="0" hangingPunct="1">
+      <a:defRPr sz="1200" kern="1200">
+        <a:solidFill>
+          <a:schemeClr val="tx1"/>
+        </a:solidFill>
+        <a:latin typeface="+mn-lt"/>
+        <a:ea typeface="+mn-ea"/>
+        <a:cs typeface="+mn-cs"/>
+      </a:defRPr>
+    </a:lvl3pPr>
+    <a:lvl4pPr marL="1371600" algn="l" defTabSz="914400" rtl="0" eaLnBrk="1" latinLnBrk="0" hangingPunct="1">
+      <a:defRPr sz="1200" kern="1200">
+        <a:solidFill>
+          <a:schemeClr val="tx1"/>
+        </a:solidFill>
+        <a:latin typeface="+mn-lt"/>
+        <a:ea typeface="+mn-ea"/>
+        <a:cs typeface="+mn-cs"/>
+      </a:defRPr>
+    </a:lvl4pPr>
+    <a:lvl5pPr marL="1828800" algn="l" defTabSz="914400" rtl="0" eaLnBrk="1" latinLnBrk="0" hangingPunct="1">
+      <a:defRPr sz="1200" kern="1200">
+        <a:solidFill>
+          <a:schemeClr val="tx1"/>
+        </a:solidFill>
+        <a:latin typeface="+mn-lt"/>
+        <a:ea typeface="+mn-ea"/>
+        <a:cs typeface="+mn-cs"/>
+      </a:defRPr>
+    </a:lvl5pPr>
+    <a:lvl6pPr marL="2286000" algn="l" defTabSz="914400" rtl="0" eaLnBrk="1" latinLnBrk="0" hangingPunct="1">
+      <a:defRPr sz="1200" kern="1200">
+        <a:solidFill>
+          <a:schemeClr val="tx1"/>
+        </a:solidFill>
+        <a:latin typeface="+mn-lt"/>
+        <a:ea typeface="+mn-ea"/>
+        <a:cs typeface="+mn-cs"/>
+      </a:defRPr>
+    </a:lvl6pPr>
+    <a:lvl7pPr marL="2743200" algn="l" defTabSz="914400" rtl="0" eaLnBrk="1" latinLnBrk="0" hangingPunct="1">
+      <a:defRPr sz="1200" kern="1200">
+        <a:solidFill>
+          <a:schemeClr val="tx1"/>
+        </a:solidFill>
+        <a:latin typeface="+mn-lt"/>
+        <a:ea typeface="+mn-ea"/>
+        <a:cs typeface="+mn-cs"/>
+      </a:defRPr>
+    </a:lvl7pPr>
+    <a:lvl8pPr marL="3200400" algn="l" defTabSz="914400" rtl="0" eaLnBrk="1" latinLnBrk="0" hangingPunct="1">
+      <a:defRPr sz="1200" kern="1200">
+        <a:solidFill>
+          <a:schemeClr val="tx1"/>
+        </a:solidFill>
+        <a:latin typeface="+mn-lt"/>
+        <a:ea typeface="+mn-ea"/>
+        <a:cs typeface="+mn-cs"/>
+      </a:defRPr>
+    </a:lvl8pPr>
+    <a:lvl9pPr marL="3657600" algn="l" defTabSz="914400" rtl="0" eaLnBrk="1" latinLnBrk="0" hangingPunct="1">
+      <a:defRPr sz="1200" kern="1200">
+        <a:solidFill>
+          <a:schemeClr val="tx1"/>
+        </a:solidFill>
+        <a:latin typeface="+mn-lt"/>
+        <a:ea typeface="+mn-ea"/>
+        <a:cs typeface="+mn-cs"/>
+      </a:defRPr>
+    </a:lvl9pPr>
+  </p:notesStyle>
+</p:notesMaster>
+</file>
+
+<file path=ppt/notesSlides/notesSlide1.xml><?xml version="1.0" encoding="utf-8"?>
+<p:notes xmlns:a="http://schemas.openxmlformats.org/drawingml/2006/main" xmlns:r="http://schemas.openxmlformats.org/officeDocument/2006/relationships" xmlns:p="http://schemas.openxmlformats.org/presentationml/2006/main">
+  <p:cSld>
+    <p:spTree>
+      <p:nvGrpSpPr>
+        <p:cNvPr id="1" name=""/>
+        <p:cNvGrpSpPr/>
+        <p:nvPr/>
+      </p:nvGrpSpPr>
+      <p:grpSpPr>
+        <a:xfrm>
+          <a:off x="0" y="0"/>
+          <a:ext cx="0" cy="0"/>
+          <a:chOff x="0" y="0"/>
+          <a:chExt cx="0" cy="0"/>
+        </a:xfrm>
+      </p:grpSpPr>
+      <p:sp>
+        <p:nvSpPr>
+          <p:cNvPr id="2" name="Segnaposto immagine diapositiva 1"/>
+          <p:cNvSpPr>
+            <a:spLocks noGrp="1" noRot="1" noChangeAspect="1"/>
+          </p:cNvSpPr>
+          <p:nvPr>
+            <p:ph type="sldImg"/>
+          </p:nvPr>
+        </p:nvSpPr>
+        <p:spPr/>
+      </p:sp>
+      <p:sp>
+        <p:nvSpPr>
+          <p:cNvPr id="3" name="Segnaposto note 2"/>
+          <p:cNvSpPr>
+            <a:spLocks noGrp="1"/>
+          </p:cNvSpPr>
+          <p:nvPr>
+            <p:ph type="body" idx="1"/>
+          </p:nvPr>
+        </p:nvSpPr>
+        <p:spPr/>
+        <p:txBody>
+          <a:bodyPr/>
+          <a:lstStyle/>
+          <a:p>
+            <a:endParaRPr lang="en-US" dirty="0"/>
+          </a:p>
+        </p:txBody>
+      </p:sp>
+      <p:sp>
+        <p:nvSpPr>
+          <p:cNvPr id="4" name="Segnaposto numero diapositiva 3"/>
+          <p:cNvSpPr>
+            <a:spLocks noGrp="1"/>
+          </p:cNvSpPr>
+          <p:nvPr>
+            <p:ph type="sldNum" sz="quarter" idx="10"/>
+          </p:nvPr>
+        </p:nvSpPr>
+        <p:spPr/>
+        <p:txBody>
+          <a:bodyPr/>
+          <a:lstStyle/>
+          <a:p>
+            <a:fld id="{817BF706-9A80-43C7-B836-7F4C1C6E9964}" type="slidenum">
+              <a:rPr lang="en-US" smtClean="0"/>
+              <a:t>1</a:t>
+            </a:fld>
+            <a:endParaRPr lang="en-US"/>
+          </a:p>
+        </p:txBody>
+      </p:sp>
+    </p:spTree>
+    <p:extLst>
+      <p:ext uri="{BB962C8B-B14F-4D97-AF65-F5344CB8AC3E}">
+        <p14:creationId xmlns:p14="http://schemas.microsoft.com/office/powerpoint/2010/main" val="3826753880"/>
+      </p:ext>
+    </p:extLst>
+  </p:cSld>
+  <p:clrMapOvr>
+    <a:masterClrMapping/>
+  </p:clrMapOvr>
+</p:notes>
 </file>
 
 <file path=ppt/slideLayouts/slideLayout1.xml><?xml version="1.0" encoding="utf-8"?>
@@ -256,7 +698,7 @@
           <a:p>
             <a:fld id="{87AD5B82-9637-481F-8FF4-6C274D9209B6}" type="datetimeFigureOut">
               <a:rPr lang="en-US" smtClean="0"/>
-              <a:t>9/13/2018</a:t>
+              <a:t>9/14/2018</a:t>
             </a:fld>
             <a:endParaRPr lang="en-US"/>
           </a:p>
@@ -456,7 +898,7 @@
           <a:p>
             <a:fld id="{87AD5B82-9637-481F-8FF4-6C274D9209B6}" type="datetimeFigureOut">
               <a:rPr lang="en-US" smtClean="0"/>
-              <a:t>9/13/2018</a:t>
+              <a:t>9/14/2018</a:t>
             </a:fld>
             <a:endParaRPr lang="en-US"/>
           </a:p>
@@ -666,7 +1108,7 @@
           <a:p>
             <a:fld id="{87AD5B82-9637-481F-8FF4-6C274D9209B6}" type="datetimeFigureOut">
               <a:rPr lang="en-US" smtClean="0"/>
-              <a:t>9/13/2018</a:t>
+              <a:t>9/14/2018</a:t>
             </a:fld>
             <a:endParaRPr lang="en-US"/>
           </a:p>
@@ -866,7 +1308,7 @@
           <a:p>
             <a:fld id="{87AD5B82-9637-481F-8FF4-6C274D9209B6}" type="datetimeFigureOut">
               <a:rPr lang="en-US" smtClean="0"/>
-              <a:t>9/13/2018</a:t>
+              <a:t>9/14/2018</a:t>
             </a:fld>
             <a:endParaRPr lang="en-US"/>
           </a:p>
@@ -1142,7 +1584,7 @@
           <a:p>
             <a:fld id="{87AD5B82-9637-481F-8FF4-6C274D9209B6}" type="datetimeFigureOut">
               <a:rPr lang="en-US" smtClean="0"/>
-              <a:t>9/13/2018</a:t>
+              <a:t>9/14/2018</a:t>
             </a:fld>
             <a:endParaRPr lang="en-US"/>
           </a:p>
@@ -1410,7 +1852,7 @@
           <a:p>
             <a:fld id="{87AD5B82-9637-481F-8FF4-6C274D9209B6}" type="datetimeFigureOut">
               <a:rPr lang="en-US" smtClean="0"/>
-              <a:t>9/13/2018</a:t>
+              <a:t>9/14/2018</a:t>
             </a:fld>
             <a:endParaRPr lang="en-US"/>
           </a:p>
@@ -1825,7 +2267,7 @@
           <a:p>
             <a:fld id="{87AD5B82-9637-481F-8FF4-6C274D9209B6}" type="datetimeFigureOut">
               <a:rPr lang="en-US" smtClean="0"/>
-              <a:t>9/13/2018</a:t>
+              <a:t>9/14/2018</a:t>
             </a:fld>
             <a:endParaRPr lang="en-US"/>
           </a:p>
@@ -1967,7 +2409,7 @@
           <a:p>
             <a:fld id="{87AD5B82-9637-481F-8FF4-6C274D9209B6}" type="datetimeFigureOut">
               <a:rPr lang="en-US" smtClean="0"/>
-              <a:t>9/13/2018</a:t>
+              <a:t>9/14/2018</a:t>
             </a:fld>
             <a:endParaRPr lang="en-US"/>
           </a:p>
@@ -2080,7 +2522,7 @@
           <a:p>
             <a:fld id="{87AD5B82-9637-481F-8FF4-6C274D9209B6}" type="datetimeFigureOut">
               <a:rPr lang="en-US" smtClean="0"/>
-              <a:t>9/13/2018</a:t>
+              <a:t>9/14/2018</a:t>
             </a:fld>
             <a:endParaRPr lang="en-US"/>
           </a:p>
@@ -2393,7 +2835,7 @@
           <a:p>
             <a:fld id="{87AD5B82-9637-481F-8FF4-6C274D9209B6}" type="datetimeFigureOut">
               <a:rPr lang="en-US" smtClean="0"/>
-              <a:t>9/13/2018</a:t>
+              <a:t>9/14/2018</a:t>
             </a:fld>
             <a:endParaRPr lang="en-US"/>
           </a:p>
@@ -2682,7 +3124,7 @@
           <a:p>
             <a:fld id="{87AD5B82-9637-481F-8FF4-6C274D9209B6}" type="datetimeFigureOut">
               <a:rPr lang="en-US" smtClean="0"/>
-              <a:t>9/13/2018</a:t>
+              <a:t>9/14/2018</a:t>
             </a:fld>
             <a:endParaRPr lang="en-US"/>
           </a:p>
@@ -2925,7 +3367,7 @@
           <a:p>
             <a:fld id="{87AD5B82-9637-481F-8FF4-6C274D9209B6}" type="datetimeFigureOut">
               <a:rPr lang="en-US" smtClean="0"/>
-              <a:t>9/13/2018</a:t>
+              <a:t>9/14/2018</a:t>
             </a:fld>
             <a:endParaRPr lang="en-US"/>
           </a:p>
@@ -3344,40 +3786,10 @@
       </p:grpSpPr>
       <p:pic>
         <p:nvPicPr>
-          <p:cNvPr id="5" name="Immagine 4">
-            <a:extLst>
-              <a:ext uri="{FF2B5EF4-FFF2-40B4-BE49-F238E27FC236}">
-                <a16:creationId xmlns:a16="http://schemas.microsoft.com/office/drawing/2014/main" id="{8F46FC83-331B-4656-A51A-BDCE566A1E1E}"/>
-              </a:ext>
-            </a:extLst>
-          </p:cNvPr>
-          <p:cNvPicPr>
-            <a:picLocks noChangeAspect="1"/>
-          </p:cNvPicPr>
-          <p:nvPr/>
-        </p:nvPicPr>
-        <p:blipFill>
-          <a:blip r:embed="rId2"/>
-          <a:stretch>
-            <a:fillRect/>
-          </a:stretch>
-        </p:blipFill>
-        <p:spPr>
-          <a:xfrm>
-            <a:off x="6641207" y="674000"/>
-            <a:ext cx="2972575" cy="2676305"/>
-          </a:xfrm>
-          <a:prstGeom prst="rect">
-            <a:avLst/>
-          </a:prstGeom>
-        </p:spPr>
-      </p:pic>
-      <p:pic>
-        <p:nvPicPr>
-          <p:cNvPr id="6" name="Immagine 5">
-            <a:extLst>
-              <a:ext uri="{FF2B5EF4-FFF2-40B4-BE49-F238E27FC236}">
-                <a16:creationId xmlns:a16="http://schemas.microsoft.com/office/drawing/2014/main" id="{ED5F65E0-B9B0-496F-B326-2419E919EC29}"/>
+          <p:cNvPr id="2" name="Immagine 1">
+            <a:extLst>
+              <a:ext uri="{FF2B5EF4-FFF2-40B4-BE49-F238E27FC236}">
+                <a16:creationId xmlns:a16="http://schemas.microsoft.com/office/drawing/2014/main" id="{209BB55F-D201-4A6E-B437-909C39645759}"/>
               </a:ext>
             </a:extLst>
           </p:cNvPr>
@@ -3394,8 +3806,38 @@
         </p:blipFill>
         <p:spPr>
           <a:xfrm>
-            <a:off x="792042" y="674000"/>
-            <a:ext cx="5506121" cy="4962231"/>
+            <a:off x="792041" y="674000"/>
+            <a:ext cx="5482808" cy="4936167"/>
+          </a:xfrm>
+          <a:prstGeom prst="rect">
+            <a:avLst/>
+          </a:prstGeom>
+        </p:spPr>
+      </p:pic>
+      <p:pic>
+        <p:nvPicPr>
+          <p:cNvPr id="5" name="Immagine 4">
+            <a:extLst>
+              <a:ext uri="{FF2B5EF4-FFF2-40B4-BE49-F238E27FC236}">
+                <a16:creationId xmlns:a16="http://schemas.microsoft.com/office/drawing/2014/main" id="{8F46FC83-331B-4656-A51A-BDCE566A1E1E}"/>
+              </a:ext>
+            </a:extLst>
+          </p:cNvPr>
+          <p:cNvPicPr>
+            <a:picLocks noChangeAspect="1"/>
+          </p:cNvPicPr>
+          <p:nvPr/>
+        </p:nvPicPr>
+        <p:blipFill>
+          <a:blip r:embed="rId4"/>
+          <a:stretch>
+            <a:fillRect/>
+          </a:stretch>
+        </p:blipFill>
+        <p:spPr>
+          <a:xfrm>
+            <a:off x="6641207" y="674000"/>
+            <a:ext cx="2972575" cy="2676305"/>
           </a:xfrm>
           <a:prstGeom prst="rect">
             <a:avLst/>
@@ -3779,8 +4221,8 @@
         </p:nvSpPr>
         <p:spPr>
           <a:xfrm>
-            <a:off x="6613425" y="4454079"/>
-            <a:ext cx="3028137" cy="646331"/>
+            <a:off x="7045339" y="4235965"/>
+            <a:ext cx="2164310" cy="646331"/>
           </a:xfrm>
           <a:prstGeom prst="rect">
             <a:avLst/>
@@ -3804,19 +4246,125 @@
             </a:r>
             <a:r>
               <a:rPr lang="it-IT" dirty="0"/>
-              <a:t> between matrixes:</a:t>
+              <a:t> between </a:t>
             </a:r>
           </a:p>
           <a:p>
             <a:pPr algn="ctr"/>
             <a:r>
-              <a:rPr lang="en-US" b="1" dirty="0">
+              <a:rPr lang="it-IT" dirty="0"/>
+              <a:t>matrixes: </a:t>
+            </a:r>
+            <a:r>
+              <a:rPr lang="it-IT" b="1" dirty="0">
                 <a:solidFill>
                   <a:srgbClr val="0070C0"/>
                 </a:solidFill>
               </a:rPr>
-              <a:t>- 0.40335</a:t>
-            </a:r>
+              <a:t>negative</a:t>
+            </a:r>
+            <a:endParaRPr lang="en-US" b="1" dirty="0">
+              <a:solidFill>
+                <a:srgbClr val="0070C0"/>
+              </a:solidFill>
+            </a:endParaRPr>
+          </a:p>
+        </p:txBody>
+      </p:sp>
+      <p:sp>
+        <p:nvSpPr>
+          <p:cNvPr id="3" name="Freccia in giù 2">
+            <a:extLst>
+              <a:ext uri="{FF2B5EF4-FFF2-40B4-BE49-F238E27FC236}">
+                <a16:creationId xmlns:a16="http://schemas.microsoft.com/office/drawing/2014/main" id="{B5E147EE-0CB4-4452-A3F8-FBCBD8FB0EB3}"/>
+              </a:ext>
+            </a:extLst>
+          </p:cNvPr>
+          <p:cNvSpPr/>
+          <p:nvPr/>
+        </p:nvSpPr>
+        <p:spPr>
+          <a:xfrm>
+            <a:off x="8041625" y="4931824"/>
+            <a:ext cx="171738" cy="312053"/>
+          </a:xfrm>
+          <a:prstGeom prst="downArrow">
+            <a:avLst/>
+          </a:prstGeom>
+          <a:solidFill>
+            <a:schemeClr val="accent5">
+              <a:alpha val="50000"/>
+            </a:schemeClr>
+          </a:solidFill>
+          <a:ln>
+            <a:noFill/>
+          </a:ln>
+        </p:spPr>
+        <p:style>
+          <a:lnRef idx="0">
+            <a:scrgbClr r="0" g="0" b="0"/>
+          </a:lnRef>
+          <a:fillRef idx="0">
+            <a:scrgbClr r="0" g="0" b="0"/>
+          </a:fillRef>
+          <a:effectRef idx="0">
+            <a:scrgbClr r="0" g="0" b="0"/>
+          </a:effectRef>
+          <a:fontRef idx="minor">
+            <a:schemeClr val="lt1"/>
+          </a:fontRef>
+        </p:style>
+        <p:txBody>
+          <a:bodyPr rtlCol="0" anchor="ctr"/>
+          <a:lstStyle/>
+          <a:p>
+            <a:pPr algn="ctr"/>
+            <a:endParaRPr lang="en-US"/>
+          </a:p>
+        </p:txBody>
+      </p:sp>
+      <p:sp>
+        <p:nvSpPr>
+          <p:cNvPr id="15" name="CasellaDiTesto 14">
+            <a:extLst>
+              <a:ext uri="{FF2B5EF4-FFF2-40B4-BE49-F238E27FC236}">
+                <a16:creationId xmlns:a16="http://schemas.microsoft.com/office/drawing/2014/main" id="{1CD57BEF-041C-4E5B-825D-6390FFE0ADA8}"/>
+              </a:ext>
+            </a:extLst>
+          </p:cNvPr>
+          <p:cNvSpPr txBox="1"/>
+          <p:nvPr/>
+        </p:nvSpPr>
+        <p:spPr>
+          <a:xfrm>
+            <a:off x="7226156" y="5240471"/>
+            <a:ext cx="1802674" cy="338554"/>
+          </a:xfrm>
+          <a:prstGeom prst="rect">
+            <a:avLst/>
+          </a:prstGeom>
+          <a:noFill/>
+        </p:spPr>
+        <p:txBody>
+          <a:bodyPr wrap="none" rtlCol="0">
+            <a:spAutoFit/>
+          </a:bodyPr>
+          <a:lstStyle/>
+          <a:p>
+            <a:pPr algn="ctr"/>
+            <a:r>
+              <a:rPr lang="it-IT" sz="1600" dirty="0">
+                <a:solidFill>
+                  <a:srgbClr val="0070C0"/>
+                </a:solidFill>
+              </a:rPr>
+              <a:t>GOOD CLUSTERING</a:t>
+            </a:r>
+            <a:endParaRPr lang="en-US" sz="1600" dirty="0">
+              <a:solidFill>
+                <a:srgbClr val="0070C0"/>
+              </a:solidFill>
+            </a:endParaRPr>
           </a:p>
         </p:txBody>
       </p:sp>
@@ -4126,4 +4674,299 @@
     </a:ext>
   </a:extLst>
 </a:theme>
+</file>
+
+<file path=ppt/theme/theme2.xml><?xml version="1.0" encoding="utf-8"?>
+<a:theme xmlns:a="http://schemas.openxmlformats.org/drawingml/2006/main" name="Tema di Office">
+  <a:themeElements>
+    <a:clrScheme name="Office">
+      <a:dk1>
+        <a:sysClr val="windowText" lastClr="000000"/>
+      </a:dk1>
+      <a:lt1>
+        <a:sysClr val="window" lastClr="FFFFFF"/>
+      </a:lt1>
+      <a:dk2>
+        <a:srgbClr val="44546A"/>
+      </a:dk2>
+      <a:lt2>
+        <a:srgbClr val="E7E6E6"/>
+      </a:lt2>
+      <a:accent1>
+        <a:srgbClr val="4472C4"/>
+      </a:accent1>
+      <a:accent2>
+        <a:srgbClr val="ED7D31"/>
+      </a:accent2>
+      <a:accent3>
+        <a:srgbClr val="A5A5A5"/>
+      </a:accent3>
+      <a:accent4>
+        <a:srgbClr val="FFC000"/>
+      </a:accent4>
+      <a:accent5>
+        <a:srgbClr val="5B9BD5"/>
+      </a:accent5>
+      <a:accent6>
+        <a:srgbClr val="70AD47"/>
+      </a:accent6>
+      <a:hlink>
+        <a:srgbClr val="0563C1"/>
+      </a:hlink>
+      <a:folHlink>
+        <a:srgbClr val="954F72"/>
+      </a:folHlink>
+    </a:clrScheme>
+    <a:fontScheme name="Office">
+      <a:majorFont>
+        <a:latin typeface="Calibri Light" panose="020F0302020204030204"/>
+        <a:ea typeface=""/>
+        <a:cs typeface=""/>
+        <a:font script="Jpan" typeface="游ゴシック Light"/>
+        <a:font script="Hang" typeface="맑은 고딕"/>
+        <a:font script="Hans" typeface="等线 Light"/>
+        <a:font script="Hant" typeface="新細明體"/>
+        <a:font script="Arab" typeface="Times New Roman"/>
+        <a:font script="Hebr" typeface="Times New Roman"/>
+        <a:font script="Thai" typeface="Angsana New"/>
+        <a:font script="Ethi" typeface="Nyala"/>
+        <a:font script="Beng" typeface="Vrinda"/>
+        <a:font script="Gujr" typeface="Shruti"/>
+        <a:font script="Khmr" typeface="MoolBoran"/>
+        <a:font script="Knda" typeface="Tunga"/>
+        <a:font script="Guru" typeface="Raavi"/>
+        <a:font script="Cans" typeface="Euphemia"/>
+        <a:font script="Cher" typeface="Plantagenet Cherokee"/>
+        <a:font script="Yiii" typeface="Microsoft Yi Baiti"/>
+        <a:font script="Tibt" typeface="Microsoft Himalaya"/>
+        <a:font script="Thaa" typeface="MV Boli"/>
+        <a:font script="Deva" typeface="Mangal"/>
+        <a:font script="Telu" typeface="Gautami"/>
+        <a:font script="Taml" typeface="Latha"/>
+        <a:font script="Syrc" typeface="Estrangelo Edessa"/>
+        <a:font script="Orya" typeface="Kalinga"/>
+        <a:font script="Mlym" typeface="Kartika"/>
+        <a:font script="Laoo" typeface="DokChampa"/>
+        <a:font script="Sinh" typeface="Iskoola Pota"/>
+        <a:font script="Mong" typeface="Mongolian Baiti"/>
+        <a:font script="Viet" typeface="Times New Roman"/>
+        <a:font script="Uigh" typeface="Microsoft Uighur"/>
+        <a:font script="Geor" typeface="Sylfaen"/>
+        <a:font script="Armn" typeface="Arial"/>
+        <a:font script="Bugi" typeface="Leelawadee UI"/>
+        <a:font script="Bopo" typeface="Microsoft JhengHei"/>
+        <a:font script="Java" typeface="Javanese Text"/>
+        <a:font script="Lisu" typeface="Segoe UI"/>
+        <a:font script="Mymr" typeface="Myanmar Text"/>
+        <a:font script="Nkoo" typeface="Ebrima"/>
+        <a:font script="Olck" typeface="Nirmala UI"/>
+        <a:font script="Osma" typeface="Ebrima"/>
+        <a:font script="Phag" typeface="Phagspa"/>
+        <a:font script="Syrn" typeface="Estrangelo Edessa"/>
+        <a:font script="Syrj" typeface="Estrangelo Edessa"/>
+        <a:font script="Syre" typeface="Estrangelo Edessa"/>
+        <a:font script="Sora" typeface="Nirmala UI"/>
+        <a:font script="Tale" typeface="Microsoft Tai Le"/>
+        <a:font script="Talu" typeface="Microsoft New Tai Lue"/>
+        <a:font script="Tfng" typeface="Ebrima"/>
+      </a:majorFont>
+      <a:minorFont>
+        <a:latin typeface="Calibri" panose="020F0502020204030204"/>
+        <a:ea typeface=""/>
+        <a:cs typeface=""/>
+        <a:font script="Jpan" typeface="游ゴシック"/>
+        <a:font script="Hang" typeface="맑은 고딕"/>
+        <a:font script="Hans" typeface="等线"/>
+        <a:font script="Hant" typeface="新細明體"/>
+        <a:font script="Arab" typeface="Arial"/>
+        <a:font script="Hebr" typeface="Arial"/>
+        <a:font script="Thai" typeface="Cordia New"/>
+        <a:font script="Ethi" typeface="Nyala"/>
+        <a:font script="Beng" typeface="Vrinda"/>
+        <a:font script="Gujr" typeface="Shruti"/>
+        <a:font script="Khmr" typeface="DaunPenh"/>
+        <a:font script="Knda" typeface="Tunga"/>
+        <a:font script="Guru" typeface="Raavi"/>
+        <a:font script="Cans" typeface="Euphemia"/>
+        <a:font script="Cher" typeface="Plantagenet Cherokee"/>
+        <a:font script="Yiii" typeface="Microsoft Yi Baiti"/>
+        <a:font script="Tibt" typeface="Microsoft Himalaya"/>
+        <a:font script="Thaa" typeface="MV Boli"/>
+        <a:font script="Deva" typeface="Mangal"/>
+        <a:font script="Telu" typeface="Gautami"/>
+        <a:font script="Taml" typeface="Latha"/>
+        <a:font script="Syrc" typeface="Estrangelo Edessa"/>
+        <a:font script="Orya" typeface="Kalinga"/>
+        <a:font script="Mlym" typeface="Kartika"/>
+        <a:font script="Laoo" typeface="DokChampa"/>
+        <a:font script="Sinh" typeface="Iskoola Pota"/>
+        <a:font script="Mong" typeface="Mongolian Baiti"/>
+        <a:font script="Viet" typeface="Arial"/>
+        <a:font script="Uigh" typeface="Microsoft Uighur"/>
+        <a:font script="Geor" typeface="Sylfaen"/>
+        <a:font script="Armn" typeface="Arial"/>
+        <a:font script="Bugi" typeface="Leelawadee UI"/>
+        <a:font script="Bopo" typeface="Microsoft JhengHei"/>
+        <a:font script="Java" typeface="Javanese Text"/>
+        <a:font script="Lisu" typeface="Segoe UI"/>
+        <a:font script="Mymr" typeface="Myanmar Text"/>
+        <a:font script="Nkoo" typeface="Ebrima"/>
+        <a:font script="Olck" typeface="Nirmala UI"/>
+        <a:font script="Osma" typeface="Ebrima"/>
+        <a:font script="Phag" typeface="Phagspa"/>
+        <a:font script="Syrn" typeface="Estrangelo Edessa"/>
+        <a:font script="Syrj" typeface="Estrangelo Edessa"/>
+        <a:font script="Syre" typeface="Estrangelo Edessa"/>
+        <a:font script="Sora" typeface="Nirmala UI"/>
+        <a:font script="Tale" typeface="Microsoft Tai Le"/>
+        <a:font script="Talu" typeface="Microsoft New Tai Lue"/>
+        <a:font script="Tfng" typeface="Ebrima"/>
+      </a:minorFont>
+    </a:fontScheme>
+    <a:fmtScheme name="Office">
+      <a:fillStyleLst>
+        <a:solidFill>
+          <a:schemeClr val="phClr"/>
+        </a:solidFill>
+        <a:gradFill rotWithShape="1">
+          <a:gsLst>
+            <a:gs pos="0">
+              <a:schemeClr val="phClr">
+                <a:lumMod val="110000"/>
+                <a:satMod val="105000"/>
+                <a:tint val="67000"/>
+              </a:schemeClr>
+            </a:gs>
+            <a:gs pos="50000">
+              <a:schemeClr val="phClr">
+                <a:lumMod val="105000"/>
+                <a:satMod val="103000"/>
+                <a:tint val="73000"/>
+              </a:schemeClr>
+            </a:gs>
+            <a:gs pos="100000">
+              <a:schemeClr val="phClr">
+                <a:lumMod val="105000"/>
+                <a:satMod val="109000"/>
+                <a:tint val="81000"/>
+              </a:schemeClr>
+            </a:gs>
+          </a:gsLst>
+          <a:lin ang="5400000" scaled="0"/>
+        </a:gradFill>
+        <a:gradFill rotWithShape="1">
+          <a:gsLst>
+            <a:gs pos="0">
+              <a:schemeClr val="phClr">
+                <a:satMod val="103000"/>
+                <a:lumMod val="102000"/>
+                <a:tint val="94000"/>
+              </a:schemeClr>
+            </a:gs>
+            <a:gs pos="50000">
+              <a:schemeClr val="phClr">
+                <a:satMod val="110000"/>
+                <a:lumMod val="100000"/>
+                <a:shade val="100000"/>
+              </a:schemeClr>
+            </a:gs>
+            <a:gs pos="100000">
+              <a:schemeClr val="phClr">
+                <a:lumMod val="99000"/>
+                <a:satMod val="120000"/>
+                <a:shade val="78000"/>
+              </a:schemeClr>
+            </a:gs>
+          </a:gsLst>
+          <a:lin ang="5400000" scaled="0"/>
+        </a:gradFill>
+      </a:fillStyleLst>
+      <a:lnStyleLst>
+        <a:ln w="6350" cap="flat" cmpd="sng" algn="ctr">
+          <a:solidFill>
+            <a:schemeClr val="phClr"/>
+          </a:solidFill>
+          <a:prstDash val="solid"/>
+          <a:miter lim="800000"/>
+        </a:ln>
+        <a:ln w="12700" cap="flat" cmpd="sng" algn="ctr">
+          <a:solidFill>
+            <a:schemeClr val="phClr"/>
+          </a:solidFill>
+          <a:prstDash val="solid"/>
+          <a:miter lim="800000"/>
+        </a:ln>
+        <a:ln w="19050" cap="flat" cmpd="sng" algn="ctr">
+          <a:solidFill>
+            <a:schemeClr val="phClr"/>
+          </a:solidFill>
+          <a:prstDash val="solid"/>
+          <a:miter lim="800000"/>
+        </a:ln>
+      </a:lnStyleLst>
+      <a:effectStyleLst>
+        <a:effectStyle>
+          <a:effectLst/>
+        </a:effectStyle>
+        <a:effectStyle>
+          <a:effectLst/>
+        </a:effectStyle>
+        <a:effectStyle>
+          <a:effectLst>
+            <a:outerShdw blurRad="57150" dist="19050" dir="5400000" algn="ctr" rotWithShape="0">
+              <a:srgbClr val="000000">
+                <a:alpha val="63000"/>
+              </a:srgbClr>
+            </a:outerShdw>
+          </a:effectLst>
+        </a:effectStyle>
+      </a:effectStyleLst>
+      <a:bgFillStyleLst>
+        <a:solidFill>
+          <a:schemeClr val="phClr"/>
+        </a:solidFill>
+        <a:solidFill>
+          <a:schemeClr val="phClr">
+            <a:tint val="95000"/>
+            <a:satMod val="170000"/>
+          </a:schemeClr>
+        </a:solidFill>
+        <a:gradFill rotWithShape="1">
+          <a:gsLst>
+            <a:gs pos="0">
+              <a:schemeClr val="phClr">
+                <a:tint val="93000"/>
+                <a:satMod val="150000"/>
+                <a:shade val="98000"/>
+                <a:lumMod val="102000"/>
+              </a:schemeClr>
+            </a:gs>
+            <a:gs pos="50000">
+              <a:schemeClr val="phClr">
+                <a:tint val="98000"/>
+                <a:satMod val="130000"/>
+                <a:shade val="90000"/>
+                <a:lumMod val="103000"/>
+              </a:schemeClr>
+            </a:gs>
+            <a:gs pos="100000">
+              <a:schemeClr val="phClr">
+                <a:shade val="63000"/>
+                <a:satMod val="120000"/>
+              </a:schemeClr>
+            </a:gs>
+          </a:gsLst>
+          <a:lin ang="5400000" scaled="0"/>
+        </a:gradFill>
+      </a:bgFillStyleLst>
+    </a:fmtScheme>
+  </a:themeElements>
+  <a:objectDefaults/>
+  <a:extraClrSchemeLst/>
+  <a:extLst>
+    <a:ext uri="{05A4C25C-085E-4340-85A3-A5531E510DB2}">
+      <thm15:themeFamily xmlns:thm15="http://schemas.microsoft.com/office/thememl/2012/main" name="Office Theme" id="{62F939B6-93AF-4DB8-9C6B-D6C7DFDC589F}" vid="{4A3C46E8-61CC-4603-A589-7422A47A8E4A}"/>
+    </a:ext>
+  </a:extLst>
+</a:theme>
 </file>
</xml_diff>